<commit_message>
narrative added to pres
</commit_message>
<xml_diff>
--- a/Presentation3.pptx
+++ b/Presentation3.pptx
@@ -48,12 +48,12 @@
   <pc:docChgLst>
     <pc:chgData name="Gavin Payne" userId="a7059ab5374b9f55" providerId="LiveId" clId="{6115755D-24C6-6E4B-929F-C8742E4B28AC}"/>
     <pc:docChg chg="custSel addSld modSld">
-      <pc:chgData name="Gavin Payne" userId="a7059ab5374b9f55" providerId="LiveId" clId="{6115755D-24C6-6E4B-929F-C8742E4B28AC}" dt="2023-01-16T06:49:04.844" v="210" actId="1076"/>
+      <pc:chgData name="Gavin Payne" userId="a7059ab5374b9f55" providerId="LiveId" clId="{6115755D-24C6-6E4B-929F-C8742E4B28AC}" dt="2023-01-16T09:54:05.005" v="1670" actId="20577"/>
       <pc:docMkLst>
         <pc:docMk/>
       </pc:docMkLst>
-      <pc:sldChg chg="addSp delSp modSp mod">
-        <pc:chgData name="Gavin Payne" userId="a7059ab5374b9f55" providerId="LiveId" clId="{6115755D-24C6-6E4B-929F-C8742E4B28AC}" dt="2023-01-16T06:35:01.591" v="188" actId="1076"/>
+      <pc:sldChg chg="addSp delSp modSp mod modNotesTx">
+        <pc:chgData name="Gavin Payne" userId="a7059ab5374b9f55" providerId="LiveId" clId="{6115755D-24C6-6E4B-929F-C8742E4B28AC}" dt="2023-01-16T09:48:33.384" v="1120" actId="20577"/>
         <pc:sldMkLst>
           <pc:docMk/>
           <pc:sldMk cId="3097526141" sldId="258"/>
@@ -91,8 +91,8 @@
           </ac:picMkLst>
         </pc:picChg>
       </pc:sldChg>
-      <pc:sldChg chg="addSp delSp modSp mod">
-        <pc:chgData name="Gavin Payne" userId="a7059ab5374b9f55" providerId="LiveId" clId="{6115755D-24C6-6E4B-929F-C8742E4B28AC}" dt="2023-01-16T06:49:04.844" v="210" actId="1076"/>
+      <pc:sldChg chg="addSp delSp modSp mod modNotesTx">
+        <pc:chgData name="Gavin Payne" userId="a7059ab5374b9f55" providerId="LiveId" clId="{6115755D-24C6-6E4B-929F-C8742E4B28AC}" dt="2023-01-16T09:52:28.263" v="1666" actId="20577"/>
         <pc:sldMkLst>
           <pc:docMk/>
           <pc:sldMk cId="3959464855" sldId="260"/>
@@ -130,8 +130,8 @@
           </ac:picMkLst>
         </pc:picChg>
       </pc:sldChg>
-      <pc:sldChg chg="addSp delSp modSp add mod">
-        <pc:chgData name="Gavin Payne" userId="a7059ab5374b9f55" providerId="LiveId" clId="{6115755D-24C6-6E4B-929F-C8742E4B28AC}" dt="2023-01-16T06:48:32.510" v="206" actId="1076"/>
+      <pc:sldChg chg="addSp delSp modSp add mod modNotesTx">
+        <pc:chgData name="Gavin Payne" userId="a7059ab5374b9f55" providerId="LiveId" clId="{6115755D-24C6-6E4B-929F-C8742E4B28AC}" dt="2023-01-16T09:54:05.005" v="1670" actId="20577"/>
         <pc:sldMkLst>
           <pc:docMk/>
           <pc:sldMk cId="2498522498" sldId="266"/>
@@ -586,7 +586,7 @@
           <a:p>
             <a:r>
               <a:rPr lang="en-US" b="1" dirty="0"/>
-              <a:t>Forbes b/g: </a:t>
+              <a:t>Forbes background: </a:t>
             </a:r>
             <a:r>
               <a:rPr lang="en-US" b="0" dirty="0"/>
@@ -605,13 +605,16 @@
             <a:endParaRPr lang="en-US" b="1" dirty="0"/>
           </a:p>
           <a:p>
+            <a:endParaRPr lang="en-US" b="1" dirty="0"/>
+          </a:p>
+          <a:p>
             <a:r>
               <a:rPr lang="en-US" b="1" dirty="0"/>
               <a:t>Context (why): </a:t>
             </a:r>
             <a:r>
               <a:rPr lang="en-US" b="0" dirty="0"/>
-              <a:t>Since covid, a) employee priorities have shifted</a:t>
+              <a:t>Since covid: a) employee priorities have shifted in terms of what they are looking for in an employer (for example, flexible working arrangements, working from home allowance).</a:t>
             </a:r>
           </a:p>
           <a:p>
@@ -621,17 +624,28 @@
             </a:r>
             <a:r>
               <a:rPr lang="en-US" b="0" dirty="0"/>
-              <a:t>b) employers: have had the talent pool depleted, have had to offer more flexibility to attract, retain.</a:t>
-            </a:r>
-          </a:p>
-          <a:p>
+              <a:t>b) employers: have had to compete for </a:t>
+            </a:r>
+            <a:r>
+              <a:rPr lang="en-US" b="0" dirty="0" err="1"/>
+              <a:t>labour</a:t>
+            </a:r>
             <a:r>
               <a:rPr lang="en-US" b="0" dirty="0"/>
-              <a:t>		c) 2022 list: those frictions have played out and had time to feed into the 2022 list.</a:t>
+              <a:t> in a depleted talent pool - have had to offer more flexibility to attract, retain.</a:t>
             </a:r>
           </a:p>
           <a:p>
             <a:endParaRPr lang="en-US" b="0" dirty="0"/>
+          </a:p>
+          <a:p>
+            <a:r>
+              <a:rPr lang="en-US" b="0" dirty="0"/>
+              <a:t>We believe that the survey responses for the 2022 list will have captured those frictions</a:t>
+            </a:r>
+          </a:p>
+          <a:p>
+            <a:endParaRPr lang="en-US" b="1" dirty="0"/>
           </a:p>
           <a:p>
             <a:r>
@@ -640,7 +654,19 @@
             </a:r>
             <a:r>
               <a:rPr lang="en-US" b="0" dirty="0"/>
-              <a:t>State as above.</a:t>
+              <a:t>What are the characteristics of the world’s best employers (as determined by Forbes/Statista)?</a:t>
+            </a:r>
+          </a:p>
+          <a:p>
+            <a:r>
+              <a:rPr lang="en-US" b="0" dirty="0"/>
+              <a:t>	Does a good employer make a good company and/or a good investment? </a:t>
+            </a:r>
+          </a:p>
+          <a:p>
+            <a:r>
+              <a:rPr lang="en-US" b="0" dirty="0"/>
+              <a:t>	Are there potentially other factors that may contribute to people’s perceptions of the companies they work for? Geography? Alignment with the union movement? General pay and conditions?</a:t>
             </a:r>
             <a:endParaRPr lang="en-US" b="1" dirty="0"/>
           </a:p>
@@ -892,7 +918,7 @@
             </a:r>
             <a:r>
               <a:rPr lang="en-US" b="0" dirty="0"/>
-              <a:t>bringing in finance data via the ticker code so see whether success as an acclaimed employer converts to financial performance.</a:t>
+              <a:t>After drawing out the key characteristics of the Top 100 employers, and combining the Glassdoor rating, we brought in some key financial metrics on each of the companies to measure the financial health/outlook of the companies, and whether it was related to performance as an employer.</a:t>
             </a:r>
           </a:p>
           <a:p>
@@ -913,10 +939,7 @@
               <a:tabLst/>
               <a:defRPr/>
             </a:pPr>
-            <a:r>
-              <a:rPr lang="en-US" b="0" dirty="0"/>
-              <a:t>Yahoo Finance library wrapper.</a:t>
-            </a:r>
+            <a:endParaRPr lang="en-US" b="0" dirty="0"/>
           </a:p>
           <a:p>
             <a:pPr marL="0" marR="0" lvl="0" indent="0" algn="l" defTabSz="914400" rtl="0" eaLnBrk="1" fontAlgn="auto" latinLnBrk="0" hangingPunct="1">
@@ -938,7 +961,15 @@
             </a:pPr>
             <a:r>
               <a:rPr lang="en-US" b="0" dirty="0"/>
-              <a:t>Financial metrics: </a:t>
+              <a:t>We did this using the Yahoo Finance library wrapper. It is </a:t>
+            </a:r>
+            <a:r>
+              <a:rPr lang="en-US" b="0" dirty="0" err="1"/>
+              <a:t>alibrary</a:t>
+            </a:r>
+            <a:r>
+              <a:rPr lang="en-US" b="0" dirty="0"/>
+              <a:t> that makes an unofficial API call to the Yahoo Finance server, and returns a dictionary of financial information for each listed company in the world.</a:t>
             </a:r>
           </a:p>
           <a:p>
@@ -959,10 +990,7 @@
               <a:tabLst/>
               <a:defRPr/>
             </a:pPr>
-            <a:r>
-              <a:rPr lang="en-US" b="0" dirty="0"/>
-              <a:t>	12-month stock performance, ROE (shareholder value), </a:t>
-            </a:r>
+            <a:endParaRPr lang="en-US" b="0" dirty="0"/>
           </a:p>
           <a:p>
             <a:pPr marL="0" marR="0" lvl="0" indent="0" algn="l" defTabSz="914400" rtl="0" eaLnBrk="1" fontAlgn="auto" latinLnBrk="0" hangingPunct="1">
@@ -984,6 +1012,75 @@
             </a:pPr>
             <a:r>
               <a:rPr lang="en-US" b="0" dirty="0"/>
+              <a:t>Our financial metrics of interest: </a:t>
+            </a:r>
+          </a:p>
+          <a:p>
+            <a:pPr marL="0" marR="0" lvl="0" indent="0" algn="l" defTabSz="914400" rtl="0" eaLnBrk="1" fontAlgn="auto" latinLnBrk="0" hangingPunct="1">
+              <a:lnSpc>
+                <a:spcPct val="100000"/>
+              </a:lnSpc>
+              <a:spcBef>
+                <a:spcPts val="0"/>
+              </a:spcBef>
+              <a:spcAft>
+                <a:spcPts val="0"/>
+              </a:spcAft>
+              <a:buClrTx/>
+              <a:buSzTx/>
+              <a:buFontTx/>
+              <a:buNone/>
+              <a:tabLst/>
+              <a:defRPr/>
+            </a:pPr>
+            <a:r>
+              <a:rPr lang="en-US" b="0" dirty="0"/>
+              <a:t>	12-month stock performance, </a:t>
+            </a:r>
+          </a:p>
+          <a:p>
+            <a:pPr marL="0" marR="0" lvl="0" indent="0" algn="l" defTabSz="914400" rtl="0" eaLnBrk="1" fontAlgn="auto" latinLnBrk="0" hangingPunct="1">
+              <a:lnSpc>
+                <a:spcPct val="100000"/>
+              </a:lnSpc>
+              <a:spcBef>
+                <a:spcPts val="0"/>
+              </a:spcBef>
+              <a:spcAft>
+                <a:spcPts val="0"/>
+              </a:spcAft>
+              <a:buClrTx/>
+              <a:buSzTx/>
+              <a:buFontTx/>
+              <a:buNone/>
+              <a:tabLst/>
+              <a:defRPr/>
+            </a:pPr>
+            <a:r>
+              <a:rPr lang="en-US" b="0" dirty="0"/>
+              <a:t>	Return on equity (Net income /  shareholder’s equity), </a:t>
+            </a:r>
+          </a:p>
+          <a:p>
+            <a:pPr marL="0" marR="0" lvl="0" indent="0" algn="l" defTabSz="914400" rtl="0" eaLnBrk="1" fontAlgn="auto" latinLnBrk="0" hangingPunct="1">
+              <a:lnSpc>
+                <a:spcPct val="100000"/>
+              </a:lnSpc>
+              <a:spcBef>
+                <a:spcPts val="0"/>
+              </a:spcBef>
+              <a:spcAft>
+                <a:spcPts val="0"/>
+              </a:spcAft>
+              <a:buClrTx/>
+              <a:buSzTx/>
+              <a:buFontTx/>
+              <a:buNone/>
+              <a:tabLst/>
+              <a:defRPr/>
+            </a:pPr>
+            <a:r>
+              <a:rPr lang="en-US" b="0" dirty="0"/>
               <a:t>	average of analyst recommendations (1 strong buy, 5 strong sell), operating income per all available in the </a:t>
             </a:r>
             <a:r>
@@ -1013,148 +1110,7 @@
               <a:tabLst/>
               <a:defRPr/>
             </a:pPr>
-            <a:r>
-              <a:rPr lang="en-US" b="0" dirty="0"/>
-              <a:t>Results (raw) : </a:t>
-            </a:r>
-          </a:p>
-          <a:p>
-            <a:pPr marL="0" marR="0" lvl="0" indent="0" algn="l" defTabSz="914400" rtl="0" eaLnBrk="1" fontAlgn="auto" latinLnBrk="0" hangingPunct="1">
-              <a:lnSpc>
-                <a:spcPct val="100000"/>
-              </a:lnSpc>
-              <a:spcBef>
-                <a:spcPts val="0"/>
-              </a:spcBef>
-              <a:spcAft>
-                <a:spcPts val="0"/>
-              </a:spcAft>
-              <a:buClrTx/>
-              <a:buSzTx/>
-              <a:buFontTx/>
-              <a:buNone/>
-              <a:tabLst/>
-              <a:defRPr/>
-            </a:pPr>
-            <a:r>
-              <a:rPr lang="en-US" b="0" dirty="0"/>
-              <a:t>Appears to be no correlation between ranking in the top 100, and financial performance.</a:t>
-            </a:r>
-          </a:p>
-          <a:p>
-            <a:pPr marL="0" marR="0" lvl="0" indent="0" algn="l" defTabSz="914400" rtl="0" eaLnBrk="1" fontAlgn="auto" latinLnBrk="0" hangingPunct="1">
-              <a:lnSpc>
-                <a:spcPct val="100000"/>
-              </a:lnSpc>
-              <a:spcBef>
-                <a:spcPts val="0"/>
-              </a:spcBef>
-              <a:spcAft>
-                <a:spcPts val="0"/>
-              </a:spcAft>
-              <a:buClrTx/>
-              <a:buSzTx/>
-              <a:buFontTx/>
-              <a:buNone/>
-              <a:tabLst/>
-              <a:defRPr/>
-            </a:pPr>
-            <a:r>
-              <a:rPr lang="en-US" b="0" dirty="0"/>
-              <a:t>	Already 100 high performing companies, multinationals, likely got in that position by being financially sound.</a:t>
-            </a:r>
-          </a:p>
-          <a:p>
-            <a:pPr marL="0" marR="0" lvl="0" indent="0" algn="l" defTabSz="914400" rtl="0" eaLnBrk="1" fontAlgn="auto" latinLnBrk="0" hangingPunct="1">
-              <a:lnSpc>
-                <a:spcPct val="100000"/>
-              </a:lnSpc>
-              <a:spcBef>
-                <a:spcPts val="0"/>
-              </a:spcBef>
-              <a:spcAft>
-                <a:spcPts val="0"/>
-              </a:spcAft>
-              <a:buClrTx/>
-              <a:buSzTx/>
-              <a:buFontTx/>
-              <a:buNone/>
-              <a:tabLst/>
-              <a:defRPr/>
-            </a:pPr>
-            <a:r>
-              <a:rPr lang="en-US" b="0" dirty="0"/>
-              <a:t>Results (standardized): </a:t>
-            </a:r>
-          </a:p>
-          <a:p>
-            <a:pPr marL="0" marR="0" lvl="0" indent="0" algn="l" defTabSz="914400" rtl="0" eaLnBrk="1" fontAlgn="auto" latinLnBrk="0" hangingPunct="1">
-              <a:lnSpc>
-                <a:spcPct val="100000"/>
-              </a:lnSpc>
-              <a:spcBef>
-                <a:spcPts val="0"/>
-              </a:spcBef>
-              <a:spcAft>
-                <a:spcPts val="0"/>
-              </a:spcAft>
-              <a:buClrTx/>
-              <a:buSzTx/>
-              <a:buFontTx/>
-              <a:buNone/>
-              <a:tabLst/>
-              <a:defRPr/>
-            </a:pPr>
-            <a:r>
-              <a:rPr lang="en-US" b="0" dirty="0"/>
-              <a:t>	Cluster around mean, particularly ROE. </a:t>
-            </a:r>
-          </a:p>
-          <a:p>
-            <a:pPr marL="0" marR="0" lvl="0" indent="0" algn="l" defTabSz="914400" rtl="0" eaLnBrk="1" fontAlgn="auto" latinLnBrk="0" hangingPunct="1">
-              <a:lnSpc>
-                <a:spcPct val="100000"/>
-              </a:lnSpc>
-              <a:spcBef>
-                <a:spcPts val="0"/>
-              </a:spcBef>
-              <a:spcAft>
-                <a:spcPts val="0"/>
-              </a:spcAft>
-              <a:buClrTx/>
-              <a:buSzTx/>
-              <a:buFontTx/>
-              <a:buNone/>
-              <a:tabLst/>
-              <a:defRPr/>
-            </a:pPr>
-            <a:r>
-              <a:rPr lang="en-US" b="0" dirty="0"/>
-              <a:t>	Stock price contained more variation, this may have to do with broader sector performance,</a:t>
-            </a:r>
-          </a:p>
-          <a:p>
-            <a:pPr marL="0" marR="0" lvl="0" indent="0" algn="l" defTabSz="914400" rtl="0" eaLnBrk="1" fontAlgn="auto" latinLnBrk="0" hangingPunct="1">
-              <a:lnSpc>
-                <a:spcPct val="100000"/>
-              </a:lnSpc>
-              <a:spcBef>
-                <a:spcPts val="0"/>
-              </a:spcBef>
-              <a:spcAft>
-                <a:spcPts val="0"/>
-              </a:spcAft>
-              <a:buClrTx/>
-              <a:buSzTx/>
-              <a:buFontTx/>
-              <a:buNone/>
-              <a:tabLst/>
-              <a:defRPr/>
-            </a:pPr>
-            <a:r>
-              <a:rPr lang="en-US" b="0" dirty="0"/>
-              <a:t>Segue to Javier’s approach.</a:t>
-            </a:r>
+            <a:endParaRPr lang="en-US" b="0" dirty="0"/>
           </a:p>
           <a:p>
             <a:pPr marL="0" marR="0" lvl="0" indent="0" algn="l" defTabSz="914400" rtl="0" eaLnBrk="1" fontAlgn="auto" latinLnBrk="0" hangingPunct="1">
@@ -1283,10 +1239,6 @@
               <a:rPr lang="en-US" b="1" dirty="0"/>
               <a:t>Our approach part 1: </a:t>
             </a:r>
-            <a:r>
-              <a:rPr lang="en-US" b="0" dirty="0"/>
-              <a:t>bringing in finance data via the ticker code so see whether success as an acclaimed employer converts to financial performance.</a:t>
-            </a:r>
           </a:p>
           <a:p>
             <a:pPr marL="0" marR="0" lvl="0" indent="0" algn="l" defTabSz="914400" rtl="0" eaLnBrk="1" fontAlgn="auto" latinLnBrk="0" hangingPunct="1">
@@ -1306,10 +1258,7 @@
               <a:tabLst/>
               <a:defRPr/>
             </a:pPr>
-            <a:r>
-              <a:rPr lang="en-US" b="0" dirty="0"/>
-              <a:t>Yahoo Finance library wrapper.</a:t>
-            </a:r>
+            <a:endParaRPr lang="en-US" b="0" dirty="0"/>
           </a:p>
           <a:p>
             <a:pPr marL="0" marR="0" lvl="0" indent="0" algn="l" defTabSz="914400" rtl="0" eaLnBrk="1" fontAlgn="auto" latinLnBrk="0" hangingPunct="1">
@@ -1331,7 +1280,7 @@
             </a:pPr>
             <a:r>
               <a:rPr lang="en-US" b="0" dirty="0"/>
-              <a:t>Financial metrics: </a:t>
+              <a:t>Results (raw) : </a:t>
             </a:r>
           </a:p>
           <a:p>
@@ -1354,7 +1303,7 @@
             </a:pPr>
             <a:r>
               <a:rPr lang="en-US" b="0" dirty="0"/>
-              <a:t>	12-month stock performance, ROE (shareholder value), </a:t>
+              <a:t>Appears to be no correlation between ranking in the top 100, and financial performance.</a:t>
             </a:r>
           </a:p>
           <a:p>
@@ -1377,15 +1326,7 @@
             </a:pPr>
             <a:r>
               <a:rPr lang="en-US" b="0" dirty="0"/>
-              <a:t>	average of analyst recommendations (1 strong buy, 5 strong sell), operating income per all available in the </a:t>
-            </a:r>
-            <a:r>
-              <a:rPr lang="en-US" b="0" dirty="0" err="1"/>
-              <a:t>yf.ticker.info</a:t>
-            </a:r>
-            <a:r>
-              <a:rPr lang="en-US" b="0" dirty="0"/>
-              <a:t> method.</a:t>
+              <a:t>Already 100 high performing companies, multinationals, likely got in that position by being financially sound.</a:t>
             </a:r>
           </a:p>
           <a:p>
@@ -1406,56 +1347,7 @@
               <a:tabLst/>
               <a:defRPr/>
             </a:pPr>
-            <a:r>
-              <a:rPr lang="en-US" b="0" dirty="0"/>
-              <a:t>Results (raw) : </a:t>
-            </a:r>
-          </a:p>
-          <a:p>
-            <a:pPr marL="0" marR="0" lvl="0" indent="0" algn="l" defTabSz="914400" rtl="0" eaLnBrk="1" fontAlgn="auto" latinLnBrk="0" hangingPunct="1">
-              <a:lnSpc>
-                <a:spcPct val="100000"/>
-              </a:lnSpc>
-              <a:spcBef>
-                <a:spcPts val="0"/>
-              </a:spcBef>
-              <a:spcAft>
-                <a:spcPts val="0"/>
-              </a:spcAft>
-              <a:buClrTx/>
-              <a:buSzTx/>
-              <a:buFontTx/>
-              <a:buNone/>
-              <a:tabLst/>
-              <a:defRPr/>
-            </a:pPr>
-            <a:r>
-              <a:rPr lang="en-US" b="0" dirty="0"/>
-              <a:t>Appears to be no correlation between ranking in the top 100, and financial performance.</a:t>
-            </a:r>
-          </a:p>
-          <a:p>
-            <a:pPr marL="0" marR="0" lvl="0" indent="0" algn="l" defTabSz="914400" rtl="0" eaLnBrk="1" fontAlgn="auto" latinLnBrk="0" hangingPunct="1">
-              <a:lnSpc>
-                <a:spcPct val="100000"/>
-              </a:lnSpc>
-              <a:spcBef>
-                <a:spcPts val="0"/>
-              </a:spcBef>
-              <a:spcAft>
-                <a:spcPts val="0"/>
-              </a:spcAft>
-              <a:buClrTx/>
-              <a:buSzTx/>
-              <a:buFontTx/>
-              <a:buNone/>
-              <a:tabLst/>
-              <a:defRPr/>
-            </a:pPr>
-            <a:r>
-              <a:rPr lang="en-US" b="0" dirty="0"/>
-              <a:t>	Already 100 high performing companies, multinationals, likely got in that position by being financially sound.</a:t>
-            </a:r>
+            <a:endParaRPr lang="en-US" b="0" dirty="0"/>
           </a:p>
           <a:p>
             <a:pPr marL="0" marR="0" lvl="0" indent="0" algn="l" defTabSz="914400" rtl="0" eaLnBrk="1" fontAlgn="auto" latinLnBrk="0" hangingPunct="1">

</xml_diff>

<commit_message>
READ me text now added
</commit_message>
<xml_diff>
--- a/Presentation3.pptx
+++ b/Presentation3.pptx
@@ -48,7 +48,7 @@
   <pc:docChgLst>
     <pc:chgData name="Gavin Payne" userId="a7059ab5374b9f55" providerId="LiveId" clId="{6115755D-24C6-6E4B-929F-C8742E4B28AC}"/>
     <pc:docChg chg="custSel addSld modSld">
-      <pc:chgData name="Gavin Payne" userId="a7059ab5374b9f55" providerId="LiveId" clId="{6115755D-24C6-6E4B-929F-C8742E4B28AC}" dt="2023-01-16T10:25:16.600" v="1711" actId="20577"/>
+      <pc:chgData name="Gavin Payne" userId="a7059ab5374b9f55" providerId="LiveId" clId="{6115755D-24C6-6E4B-929F-C8742E4B28AC}" dt="2023-01-16T12:27:50.831" v="1719" actId="20577"/>
       <pc:docMkLst>
         <pc:docMk/>
       </pc:docMkLst>
@@ -92,13 +92,13 @@
         </pc:picChg>
       </pc:sldChg>
       <pc:sldChg chg="addSp delSp modSp mod modNotesTx">
-        <pc:chgData name="Gavin Payne" userId="a7059ab5374b9f55" providerId="LiveId" clId="{6115755D-24C6-6E4B-929F-C8742E4B28AC}" dt="2023-01-16T10:25:16.600" v="1711" actId="20577"/>
+        <pc:chgData name="Gavin Payne" userId="a7059ab5374b9f55" providerId="LiveId" clId="{6115755D-24C6-6E4B-929F-C8742E4B28AC}" dt="2023-01-16T12:27:50.831" v="1719" actId="20577"/>
         <pc:sldMkLst>
           <pc:docMk/>
           <pc:sldMk cId="3959464855" sldId="260"/>
         </pc:sldMkLst>
         <pc:spChg chg="mod">
-          <ac:chgData name="Gavin Payne" userId="a7059ab5374b9f55" providerId="LiveId" clId="{6115755D-24C6-6E4B-929F-C8742E4B28AC}" dt="2023-01-16T06:00:13.568" v="9" actId="20577"/>
+          <ac:chgData name="Gavin Payne" userId="a7059ab5374b9f55" providerId="LiveId" clId="{6115755D-24C6-6E4B-929F-C8742E4B28AC}" dt="2023-01-16T12:27:50.831" v="1719" actId="20577"/>
           <ac:spMkLst>
             <pc:docMk/>
             <pc:sldMk cId="3959464855" sldId="260"/>
@@ -131,11 +131,19 @@
         </pc:picChg>
       </pc:sldChg>
       <pc:sldChg chg="addSp delSp modSp add mod modNotesTx">
-        <pc:chgData name="Gavin Payne" userId="a7059ab5374b9f55" providerId="LiveId" clId="{6115755D-24C6-6E4B-929F-C8742E4B28AC}" dt="2023-01-16T10:01:06.505" v="1701" actId="20577"/>
+        <pc:chgData name="Gavin Payne" userId="a7059ab5374b9f55" providerId="LiveId" clId="{6115755D-24C6-6E4B-929F-C8742E4B28AC}" dt="2023-01-16T12:27:37.897" v="1715" actId="20577"/>
         <pc:sldMkLst>
           <pc:docMk/>
           <pc:sldMk cId="2498522498" sldId="266"/>
         </pc:sldMkLst>
+        <pc:spChg chg="mod">
+          <ac:chgData name="Gavin Payne" userId="a7059ab5374b9f55" providerId="LiveId" clId="{6115755D-24C6-6E4B-929F-C8742E4B28AC}" dt="2023-01-16T12:27:37.897" v="1715" actId="20577"/>
+          <ac:spMkLst>
+            <pc:docMk/>
+            <pc:sldMk cId="2498522498" sldId="266"/>
+            <ac:spMk id="2" creationId="{34FB3A1B-C244-4590-DA7E-2448C607EAA4}"/>
+          </ac:spMkLst>
+        </pc:spChg>
         <pc:spChg chg="mod">
           <ac:chgData name="Gavin Payne" userId="a7059ab5374b9f55" providerId="LiveId" clId="{6115755D-24C6-6E4B-929F-C8742E4B28AC}" dt="2023-01-16T10:01:06.505" v="1701" actId="20577"/>
           <ac:spMkLst>
@@ -3556,7 +3564,7 @@
           <a:p>
             <a:r>
               <a:rPr lang="en-AU" dirty="0"/>
-              <a:t>Are good employers good companies? – Look within Top 100</a:t>
+              <a:t>Are good employers good companies? – A look within Top 100</a:t>
             </a:r>
           </a:p>
         </p:txBody>
@@ -3838,7 +3846,7 @@
           <a:p>
             <a:r>
               <a:rPr lang="en-AU" dirty="0"/>
-              <a:t>Are good employers good companies? – Look within Top 100</a:t>
+              <a:t>Are good employers good companies? – A look within Top 100</a:t>
             </a:r>
           </a:p>
         </p:txBody>

</xml_diff>